<commit_message>
include  beginning of decay calculation
</commit_message>
<xml_diff>
--- a/raw-data/RSV Data Summary.pptx
+++ b/raw-data/RSV Data Summary.pptx
@@ -5,7 +5,7 @@
     <p:sldMasterId id="2147483660" r:id="rId1"/>
   </p:sldMasterIdLst>
   <p:notesMasterIdLst>
-    <p:notesMasterId r:id="rId18"/>
+    <p:notesMasterId r:id="rId20"/>
   </p:notesMasterIdLst>
   <p:sldIdLst>
     <p:sldId id="256" r:id="rId2"/>
@@ -24,6 +24,8 @@
     <p:sldId id="266" r:id="rId15"/>
     <p:sldId id="267" r:id="rId16"/>
     <p:sldId id="271" r:id="rId17"/>
+    <p:sldId id="272" r:id="rId18"/>
+    <p:sldId id="273" r:id="rId19"/>
   </p:sldIdLst>
   <p:sldSz cx="9144000" cy="6858000" type="screen4x3"/>
   <p:notesSz cx="6858000" cy="9144000"/>
@@ -5496,10 +5498,10 @@
       </p:sp>
       <p:sp>
         <p:nvSpPr>
-          <p:cNvPr id="3" name="Content Placeholder 2">
+          <p:cNvPr id="4" name="Content Placeholder 3">
             <a:extLst>
               <a:ext uri="{FF2B5EF4-FFF2-40B4-BE49-F238E27FC236}">
-                <a16:creationId xmlns:a16="http://schemas.microsoft.com/office/drawing/2014/main" id="{B526F2BE-3CBB-9F2B-5D64-27CA5C82C302}"/>
+                <a16:creationId xmlns:a16="http://schemas.microsoft.com/office/drawing/2014/main" id="{BD0FEADE-E7CC-EC4F-825B-9EB351C4C3F8}"/>
               </a:ext>
             </a:extLst>
           </p:cNvPr>
@@ -5515,14 +5517,336 @@
           <a:bodyPr/>
           <a:lstStyle/>
           <a:p>
-            <a:endParaRPr lang="en-US"/>
-          </a:p>
-        </p:txBody>
-      </p:sp>
+            <a:r>
+              <a:rPr lang="en-US" dirty="0"/>
+              <a:t>Antibodies seem to decay  faster in infants</a:t>
+            </a:r>
+          </a:p>
+        </p:txBody>
+      </p:sp>
+      <p:pic>
+        <p:nvPicPr>
+          <p:cNvPr id="6" name="Picture 5">
+            <a:extLst>
+              <a:ext uri="{FF2B5EF4-FFF2-40B4-BE49-F238E27FC236}">
+                <a16:creationId xmlns:a16="http://schemas.microsoft.com/office/drawing/2014/main" id="{C524766A-157F-8B40-A333-626055053AD8}"/>
+              </a:ext>
+            </a:extLst>
+          </p:cNvPr>
+          <p:cNvPicPr>
+            <a:picLocks noChangeAspect="1"/>
+          </p:cNvPicPr>
+          <p:nvPr/>
+        </p:nvPicPr>
+        <p:blipFill>
+          <a:blip r:embed="rId2"/>
+          <a:stretch>
+            <a:fillRect/>
+          </a:stretch>
+        </p:blipFill>
+        <p:spPr>
+          <a:xfrm>
+            <a:off x="0" y="1920874"/>
+            <a:ext cx="9144000" cy="4572000"/>
+          </a:xfrm>
+          <a:prstGeom prst="rect">
+            <a:avLst/>
+          </a:prstGeom>
+        </p:spPr>
+      </p:pic>
     </p:spTree>
     <p:extLst>
       <p:ext uri="{BB962C8B-B14F-4D97-AF65-F5344CB8AC3E}">
         <p14:creationId xmlns:p14="http://schemas.microsoft.com/office/powerpoint/2010/main" val="37372564"/>
+      </p:ext>
+    </p:extLst>
+  </p:cSld>
+  <p:clrMapOvr>
+    <a:masterClrMapping/>
+  </p:clrMapOvr>
+</p:sld>
+</file>
+
+<file path=ppt/slides/slide17.xml><?xml version="1.0" encoding="utf-8"?>
+<p:sld xmlns:a="http://schemas.openxmlformats.org/drawingml/2006/main" xmlns:r="http://schemas.openxmlformats.org/officeDocument/2006/relationships" xmlns:p="http://schemas.openxmlformats.org/presentationml/2006/main">
+  <p:cSld>
+    <p:spTree>
+      <p:nvGrpSpPr>
+        <p:cNvPr id="1" name=""/>
+        <p:cNvGrpSpPr/>
+        <p:nvPr/>
+      </p:nvGrpSpPr>
+      <p:grpSpPr>
+        <a:xfrm>
+          <a:off x="0" y="0"/>
+          <a:ext cx="0" cy="0"/>
+          <a:chOff x="0" y="0"/>
+          <a:chExt cx="0" cy="0"/>
+        </a:xfrm>
+      </p:grpSpPr>
+      <p:sp>
+        <p:nvSpPr>
+          <p:cNvPr id="2" name="Title 1">
+            <a:extLst>
+              <a:ext uri="{FF2B5EF4-FFF2-40B4-BE49-F238E27FC236}">
+                <a16:creationId xmlns:a16="http://schemas.microsoft.com/office/drawing/2014/main" id="{B09EF4BA-926A-8B3B-01A5-0FAF8A9C5774}"/>
+              </a:ext>
+            </a:extLst>
+          </p:cNvPr>
+          <p:cNvSpPr>
+            <a:spLocks noGrp="1"/>
+          </p:cNvSpPr>
+          <p:nvPr>
+            <p:ph type="title"/>
+          </p:nvPr>
+        </p:nvSpPr>
+        <p:spPr/>
+        <p:txBody>
+          <a:bodyPr/>
+          <a:lstStyle/>
+          <a:p>
+            <a:r>
+              <a:rPr lang="en-US" dirty="0"/>
+              <a:t>Vaccine </a:t>
+            </a:r>
+            <a:r>
+              <a:rPr lang="en-US"/>
+              <a:t>induced Antibodies</a:t>
+            </a:r>
+          </a:p>
+        </p:txBody>
+      </p:sp>
+      <p:sp>
+        <p:nvSpPr>
+          <p:cNvPr id="4" name="Content Placeholder 3">
+            <a:extLst>
+              <a:ext uri="{FF2B5EF4-FFF2-40B4-BE49-F238E27FC236}">
+                <a16:creationId xmlns:a16="http://schemas.microsoft.com/office/drawing/2014/main" id="{BD0FEADE-E7CC-EC4F-825B-9EB351C4C3F8}"/>
+              </a:ext>
+            </a:extLst>
+          </p:cNvPr>
+          <p:cNvSpPr>
+            <a:spLocks noGrp="1"/>
+          </p:cNvSpPr>
+          <p:nvPr>
+            <p:ph idx="1"/>
+          </p:nvPr>
+        </p:nvSpPr>
+        <p:spPr/>
+        <p:txBody>
+          <a:bodyPr/>
+          <a:lstStyle/>
+          <a:p>
+            <a:r>
+              <a:rPr lang="en-US" dirty="0"/>
+              <a:t>Some correlation between antibodies and effectiveness.</a:t>
+            </a:r>
+          </a:p>
+        </p:txBody>
+      </p:sp>
+      <p:pic>
+        <p:nvPicPr>
+          <p:cNvPr id="6" name="Picture 5">
+            <a:extLst>
+              <a:ext uri="{FF2B5EF4-FFF2-40B4-BE49-F238E27FC236}">
+                <a16:creationId xmlns:a16="http://schemas.microsoft.com/office/drawing/2014/main" id="{C524766A-157F-8B40-A333-626055053AD8}"/>
+              </a:ext>
+            </a:extLst>
+          </p:cNvPr>
+          <p:cNvPicPr>
+            <a:picLocks noChangeAspect="1"/>
+          </p:cNvPicPr>
+          <p:nvPr/>
+        </p:nvPicPr>
+        <p:blipFill>
+          <a:blip r:embed="rId2"/>
+          <a:srcRect/>
+          <a:stretch/>
+        </p:blipFill>
+        <p:spPr>
+          <a:xfrm>
+            <a:off x="1270981" y="2185568"/>
+            <a:ext cx="6602038" cy="4572000"/>
+          </a:xfrm>
+          <a:prstGeom prst="rect">
+            <a:avLst/>
+          </a:prstGeom>
+        </p:spPr>
+      </p:pic>
+    </p:spTree>
+    <p:extLst>
+      <p:ext uri="{BB962C8B-B14F-4D97-AF65-F5344CB8AC3E}">
+        <p14:creationId xmlns:p14="http://schemas.microsoft.com/office/powerpoint/2010/main" val="3934572306"/>
+      </p:ext>
+    </p:extLst>
+  </p:cSld>
+  <p:clrMapOvr>
+    <a:masterClrMapping/>
+  </p:clrMapOvr>
+</p:sld>
+</file>
+
+<file path=ppt/slides/slide18.xml><?xml version="1.0" encoding="utf-8"?>
+<p:sld xmlns:a="http://schemas.openxmlformats.org/drawingml/2006/main" xmlns:r="http://schemas.openxmlformats.org/officeDocument/2006/relationships" xmlns:p="http://schemas.openxmlformats.org/presentationml/2006/main">
+  <p:cSld>
+    <p:spTree>
+      <p:nvGrpSpPr>
+        <p:cNvPr id="1" name=""/>
+        <p:cNvGrpSpPr/>
+        <p:nvPr/>
+      </p:nvGrpSpPr>
+      <p:grpSpPr>
+        <a:xfrm>
+          <a:off x="0" y="0"/>
+          <a:ext cx="0" cy="0"/>
+          <a:chOff x="0" y="0"/>
+          <a:chExt cx="0" cy="0"/>
+        </a:xfrm>
+      </p:grpSpPr>
+      <p:sp>
+        <p:nvSpPr>
+          <p:cNvPr id="2" name="Title 1">
+            <a:extLst>
+              <a:ext uri="{FF2B5EF4-FFF2-40B4-BE49-F238E27FC236}">
+                <a16:creationId xmlns:a16="http://schemas.microsoft.com/office/drawing/2014/main" id="{B09EF4BA-926A-8B3B-01A5-0FAF8A9C5774}"/>
+              </a:ext>
+            </a:extLst>
+          </p:cNvPr>
+          <p:cNvSpPr>
+            <a:spLocks noGrp="1"/>
+          </p:cNvSpPr>
+          <p:nvPr>
+            <p:ph type="title"/>
+          </p:nvPr>
+        </p:nvSpPr>
+        <p:spPr/>
+        <p:txBody>
+          <a:bodyPr/>
+          <a:lstStyle/>
+          <a:p>
+            <a:r>
+              <a:rPr lang="en-US" dirty="0"/>
+              <a:t>Questions</a:t>
+            </a:r>
+          </a:p>
+        </p:txBody>
+      </p:sp>
+      <p:sp>
+        <p:nvSpPr>
+          <p:cNvPr id="4" name="Content Placeholder 3">
+            <a:extLst>
+              <a:ext uri="{FF2B5EF4-FFF2-40B4-BE49-F238E27FC236}">
+                <a16:creationId xmlns:a16="http://schemas.microsoft.com/office/drawing/2014/main" id="{BD0FEADE-E7CC-EC4F-825B-9EB351C4C3F8}"/>
+              </a:ext>
+            </a:extLst>
+          </p:cNvPr>
+          <p:cNvSpPr>
+            <a:spLocks noGrp="1"/>
+          </p:cNvSpPr>
+          <p:nvPr>
+            <p:ph idx="1"/>
+          </p:nvPr>
+        </p:nvSpPr>
+        <p:spPr/>
+        <p:txBody>
+          <a:bodyPr/>
+          <a:lstStyle/>
+          <a:p>
+            <a:r>
+              <a:rPr lang="en-US" dirty="0"/>
+              <a:t>Is the decay of naturally  acquired and vaccine induced / passive antibodies similar?</a:t>
+            </a:r>
+          </a:p>
+          <a:p>
+            <a:r>
+              <a:rPr lang="en-US" dirty="0"/>
+              <a:t>Are neutralizing antibodies the best correlate of protection? Is IgG, RSV-</a:t>
+            </a:r>
+            <a:r>
+              <a:rPr lang="en-US" dirty="0" err="1"/>
+              <a:t>preF</a:t>
+            </a:r>
+            <a:r>
+              <a:rPr lang="en-US" dirty="0"/>
+              <a:t>, something else better?</a:t>
+            </a:r>
+          </a:p>
+          <a:p>
+            <a:r>
+              <a:rPr lang="en-US" dirty="0"/>
+              <a:t>Is the relationship between antibodies and effectiveness the same for infants and adults? For vaccines and </a:t>
+            </a:r>
+            <a:r>
+              <a:rPr lang="en-US"/>
+              <a:t>passive antibodies?</a:t>
+            </a:r>
+            <a:endParaRPr lang="en-US" dirty="0"/>
+          </a:p>
+        </p:txBody>
+      </p:sp>
+      <p:pic>
+        <p:nvPicPr>
+          <p:cNvPr id="6" name="Picture 5">
+            <a:extLst>
+              <a:ext uri="{FF2B5EF4-FFF2-40B4-BE49-F238E27FC236}">
+                <a16:creationId xmlns:a16="http://schemas.microsoft.com/office/drawing/2014/main" id="{C524766A-157F-8B40-A333-626055053AD8}"/>
+              </a:ext>
+            </a:extLst>
+          </p:cNvPr>
+          <p:cNvPicPr>
+            <a:picLocks noChangeAspect="1"/>
+          </p:cNvPicPr>
+          <p:nvPr/>
+        </p:nvPicPr>
+        <p:blipFill>
+          <a:blip r:embed="rId2"/>
+          <a:srcRect/>
+          <a:stretch/>
+        </p:blipFill>
+        <p:spPr>
+          <a:xfrm>
+            <a:off x="6349233" y="4852906"/>
+            <a:ext cx="2895386" cy="2005094"/>
+          </a:xfrm>
+          <a:prstGeom prst="rect">
+            <a:avLst/>
+          </a:prstGeom>
+        </p:spPr>
+      </p:pic>
+      <p:pic>
+        <p:nvPicPr>
+          <p:cNvPr id="5" name="Picture 4">
+            <a:extLst>
+              <a:ext uri="{FF2B5EF4-FFF2-40B4-BE49-F238E27FC236}">
+                <a16:creationId xmlns:a16="http://schemas.microsoft.com/office/drawing/2014/main" id="{0DBB3EEC-3A34-554E-BD91-244226700377}"/>
+              </a:ext>
+            </a:extLst>
+          </p:cNvPr>
+          <p:cNvPicPr>
+            <a:picLocks noChangeAspect="1"/>
+          </p:cNvPicPr>
+          <p:nvPr/>
+        </p:nvPicPr>
+        <p:blipFill>
+          <a:blip r:embed="rId3"/>
+          <a:stretch>
+            <a:fillRect/>
+          </a:stretch>
+        </p:blipFill>
+        <p:spPr>
+          <a:xfrm>
+            <a:off x="0" y="4716379"/>
+            <a:ext cx="4283242" cy="2141621"/>
+          </a:xfrm>
+          <a:prstGeom prst="rect">
+            <a:avLst/>
+          </a:prstGeom>
+        </p:spPr>
+      </p:pic>
+    </p:spTree>
+    <p:extLst>
+      <p:ext uri="{BB962C8B-B14F-4D97-AF65-F5344CB8AC3E}">
+        <p14:creationId xmlns:p14="http://schemas.microsoft.com/office/powerpoint/2010/main" val="979270286"/>
       </p:ext>
     </p:extLst>
   </p:cSld>

</xml_diff>